<commit_message>
Added live demo slide
</commit_message>
<xml_diff>
--- a/07-Presentation/Presentation.pptx
+++ b/07-Presentation/Presentation.pptx
@@ -5,7 +5,7 @@
     <p:sldMasterId id="2147483687" r:id="rId4"/>
   </p:sldMasterIdLst>
   <p:notesMasterIdLst>
-    <p:notesMasterId r:id="rId18"/>
+    <p:notesMasterId r:id="rId19"/>
   </p:notesMasterIdLst>
   <p:sldIdLst>
     <p:sldId id="1864" r:id="rId5"/>
@@ -18,9 +18,10 @@
     <p:sldId id="1871" r:id="rId12"/>
     <p:sldId id="1872" r:id="rId13"/>
     <p:sldId id="1866" r:id="rId14"/>
-    <p:sldId id="1873" r:id="rId15"/>
-    <p:sldId id="1874" r:id="rId16"/>
-    <p:sldId id="1858" r:id="rId17"/>
+    <p:sldId id="1875" r:id="rId15"/>
+    <p:sldId id="1873" r:id="rId16"/>
+    <p:sldId id="1874" r:id="rId17"/>
+    <p:sldId id="1858" r:id="rId18"/>
   </p:sldIdLst>
   <p:sldSz cx="12192000" cy="6858000"/>
   <p:notesSz cx="6858000" cy="9144000"/>
@@ -4065,6 +4066,111 @@
       </p:grpSpPr>
       <p:sp>
         <p:nvSpPr>
+          <p:cNvPr id="4" name="Title 3">
+            <a:extLst>
+              <a:ext uri="{FF2B5EF4-FFF2-40B4-BE49-F238E27FC236}">
+                <a16:creationId xmlns:a16="http://schemas.microsoft.com/office/drawing/2014/main" id="{FD9E38B3-4686-8247-9625-49018D29F408}"/>
+              </a:ext>
+            </a:extLst>
+          </p:cNvPr>
+          <p:cNvSpPr>
+            <a:spLocks noGrp="1"/>
+          </p:cNvSpPr>
+          <p:nvPr>
+            <p:ph type="title"/>
+          </p:nvPr>
+        </p:nvSpPr>
+        <p:spPr>
+          <a:xfrm>
+            <a:off x="1335520" y="3030566"/>
+            <a:ext cx="9141397" cy="615553"/>
+          </a:xfrm>
+        </p:spPr>
+        <p:txBody>
+          <a:bodyPr/>
+          <a:lstStyle/>
+          <a:p>
+            <a:r>
+              <a:rPr lang="en-US" dirty="0"/>
+              <a:t>Live Demo</a:t>
+            </a:r>
+          </a:p>
+        </p:txBody>
+      </p:sp>
+      <p:sp>
+        <p:nvSpPr>
+          <p:cNvPr id="5" name="Text Placeholder 4">
+            <a:extLst>
+              <a:ext uri="{FF2B5EF4-FFF2-40B4-BE49-F238E27FC236}">
+                <a16:creationId xmlns:a16="http://schemas.microsoft.com/office/drawing/2014/main" id="{1917BC83-075C-0193-09F6-C375440C99BF}"/>
+              </a:ext>
+            </a:extLst>
+          </p:cNvPr>
+          <p:cNvSpPr>
+            <a:spLocks noGrp="1"/>
+          </p:cNvSpPr>
+          <p:nvPr>
+            <p:ph type="body" sz="quarter" idx="12"/>
+          </p:nvPr>
+        </p:nvSpPr>
+        <p:spPr>
+          <a:xfrm>
+            <a:off x="2006524" y="4528788"/>
+            <a:ext cx="7799387" cy="1534757"/>
+          </a:xfrm>
+        </p:spPr>
+        <p:txBody>
+          <a:bodyPr/>
+          <a:lstStyle/>
+          <a:p>
+            <a:endParaRPr lang="en-US" dirty="0"/>
+          </a:p>
+        </p:txBody>
+      </p:sp>
+    </p:spTree>
+    <p:extLst>
+      <p:ext uri="{BB962C8B-B14F-4D97-AF65-F5344CB8AC3E}">
+        <p14:creationId xmlns:p14="http://schemas.microsoft.com/office/powerpoint/2010/main" val="1307959229"/>
+      </p:ext>
+    </p:extLst>
+  </p:cSld>
+  <p:clrMapOvr>
+    <a:masterClrMapping/>
+  </p:clrMapOvr>
+  <mc:AlternateContent xmlns:mc="http://schemas.openxmlformats.org/markup-compatibility/2006">
+    <mc:Choice xmlns:p14="http://schemas.microsoft.com/office/powerpoint/2010/main" Requires="p14">
+      <p:transition spd="med" p14:dur="700">
+        <p:fade/>
+      </p:transition>
+    </mc:Choice>
+    <mc:Fallback>
+      <p:transition spd="med">
+        <p:fade/>
+      </p:transition>
+    </mc:Fallback>
+  </mc:AlternateContent>
+</p:sld>
+</file>
+
+<file path=ppt/slides/slide12.xml><?xml version="1.0" encoding="utf-8"?>
+<p:sld xmlns:a="http://schemas.openxmlformats.org/drawingml/2006/main" xmlns:r="http://schemas.openxmlformats.org/officeDocument/2006/relationships" xmlns:p="http://schemas.openxmlformats.org/presentationml/2006/main">
+  <p:cSld>
+    <p:spTree>
+      <p:nvGrpSpPr>
+        <p:cNvPr id="1" name=""/>
+        <p:cNvGrpSpPr/>
+        <p:nvPr/>
+      </p:nvGrpSpPr>
+      <p:grpSpPr>
+        <a:xfrm>
+          <a:off x="0" y="0"/>
+          <a:ext cx="0" cy="0"/>
+          <a:chOff x="0" y="0"/>
+          <a:chExt cx="0" cy="0"/>
+        </a:xfrm>
+      </p:grpSpPr>
+      <p:sp>
+        <p:nvSpPr>
           <p:cNvPr id="3" name="Title 2">
             <a:extLst>
               <a:ext uri="{FF2B5EF4-FFF2-40B4-BE49-F238E27FC236}">
@@ -4202,7 +4308,7 @@
 </p:sld>
 </file>
 
-<file path=ppt/slides/slide12.xml><?xml version="1.0" encoding="utf-8"?>
+<file path=ppt/slides/slide13.xml><?xml version="1.0" encoding="utf-8"?>
 <p:sld xmlns:a="http://schemas.openxmlformats.org/drawingml/2006/main" xmlns:r="http://schemas.openxmlformats.org/officeDocument/2006/relationships" xmlns:p="http://schemas.openxmlformats.org/presentationml/2006/main">
   <p:cSld>
     <p:spTree>
@@ -4557,7 +4663,7 @@
 </p:sld>
 </file>
 
-<file path=ppt/slides/slide13.xml><?xml version="1.0" encoding="utf-8"?>
+<file path=ppt/slides/slide14.xml><?xml version="1.0" encoding="utf-8"?>
 <p:sld xmlns:a="http://schemas.openxmlformats.org/drawingml/2006/main" xmlns:r="http://schemas.openxmlformats.org/officeDocument/2006/relationships" xmlns:p="http://schemas.openxmlformats.org/presentationml/2006/main">
   <p:cSld>
     <p:spTree>
@@ -6430,22 +6536,12 @@
 </file>
 
 <file path=customXml/item1.xml><?xml version="1.0" encoding="utf-8"?>
-<p:properties xmlns:p="http://schemas.microsoft.com/office/2006/metadata/properties" xmlns:xsi="http://www.w3.org/2001/XMLSchema-instance" xmlns:pc="http://schemas.microsoft.com/office/infopath/2007/PartnerControls">
-  <documentManagement>
-    <Status xmlns="71af3243-3dd4-4a8d-8c0d-dd76da1f02a5">Not started</Status>
-    <_ip_UnifiedCompliancePolicyUIAction xmlns="http://schemas.microsoft.com/sharepoint/v3" xsi:nil="true"/>
-    <Image xmlns="71af3243-3dd4-4a8d-8c0d-dd76da1f02a5">
-      <Url xsi:nil="true"/>
-      <Description xsi:nil="true"/>
-    </Image>
-    <_ip_UnifiedCompliancePolicyProperties xmlns="http://schemas.microsoft.com/sharepoint/v3" xsi:nil="true"/>
-    <lcf76f155ced4ddcb4097134ff3c332f xmlns="71af3243-3dd4-4a8d-8c0d-dd76da1f02a5">
-      <Terms xmlns="http://schemas.microsoft.com/office/infopath/2007/PartnerControls"/>
-    </lcf76f155ced4ddcb4097134ff3c332f>
-    <TaxCatchAll xmlns="230e9df3-be65-4c73-a93b-d1236ebd677e"/>
-    <MediaServiceKeyPoints xmlns="71af3243-3dd4-4a8d-8c0d-dd76da1f02a5" xsi:nil="true"/>
-  </documentManagement>
-</p:properties>
+<?mso-contentType ?>
+<FormTemplates xmlns="http://schemas.microsoft.com/sharepoint/v3/contenttype/forms">
+  <Display>DocumentLibraryForm</Display>
+  <Edit>DocumentLibraryForm</Edit>
+  <New>DocumentLibraryForm</New>
+</FormTemplates>
 </file>
 
 <file path=customXml/item2.xml><?xml version="1.0" encoding="utf-8"?>
@@ -6725,22 +6821,28 @@
 </file>
 
 <file path=customXml/item3.xml><?xml version="1.0" encoding="utf-8"?>
-<?mso-contentType ?>
-<FormTemplates xmlns="http://schemas.microsoft.com/sharepoint/v3/contenttype/forms">
-  <Display>DocumentLibraryForm</Display>
-  <Edit>DocumentLibraryForm</Edit>
-  <New>DocumentLibraryForm</New>
-</FormTemplates>
+<p:properties xmlns:p="http://schemas.microsoft.com/office/2006/metadata/properties" xmlns:xsi="http://www.w3.org/2001/XMLSchema-instance" xmlns:pc="http://schemas.microsoft.com/office/infopath/2007/PartnerControls">
+  <documentManagement>
+    <Status xmlns="71af3243-3dd4-4a8d-8c0d-dd76da1f02a5">Not started</Status>
+    <_ip_UnifiedCompliancePolicyUIAction xmlns="http://schemas.microsoft.com/sharepoint/v3" xsi:nil="true"/>
+    <Image xmlns="71af3243-3dd4-4a8d-8c0d-dd76da1f02a5">
+      <Url xsi:nil="true"/>
+      <Description xsi:nil="true"/>
+    </Image>
+    <_ip_UnifiedCompliancePolicyProperties xmlns="http://schemas.microsoft.com/sharepoint/v3" xsi:nil="true"/>
+    <lcf76f155ced4ddcb4097134ff3c332f xmlns="71af3243-3dd4-4a8d-8c0d-dd76da1f02a5">
+      <Terms xmlns="http://schemas.microsoft.com/office/infopath/2007/PartnerControls"/>
+    </lcf76f155ced4ddcb4097134ff3c332f>
+    <TaxCatchAll xmlns="230e9df3-be65-4c73-a93b-d1236ebd677e"/>
+    <MediaServiceKeyPoints xmlns="71af3243-3dd4-4a8d-8c0d-dd76da1f02a5" xsi:nil="true"/>
+  </documentManagement>
+</p:properties>
 </file>
 
 <file path=customXml/itemProps1.xml><?xml version="1.0" encoding="utf-8"?>
-<ds:datastoreItem xmlns:ds="http://schemas.openxmlformats.org/officeDocument/2006/customXml" ds:itemID="{FDF283A3-AA81-4663-8764-64F64C723FD1}">
+<ds:datastoreItem xmlns:ds="http://schemas.openxmlformats.org/officeDocument/2006/customXml" ds:itemID="{915C1F8C-D27A-4CE7-9DF4-4AFDB2880FA9}">
   <ds:schemaRefs>
-    <ds:schemaRef ds:uri="http://schemas.microsoft.com/office/2006/metadata/properties"/>
-    <ds:schemaRef ds:uri="http://schemas.microsoft.com/office/infopath/2007/PartnerControls"/>
-    <ds:schemaRef ds:uri="71af3243-3dd4-4a8d-8c0d-dd76da1f02a5"/>
-    <ds:schemaRef ds:uri="http://schemas.microsoft.com/sharepoint/v3"/>
-    <ds:schemaRef ds:uri="230e9df3-be65-4c73-a93b-d1236ebd677e"/>
+    <ds:schemaRef ds:uri="http://schemas.microsoft.com/sharepoint/v3/contenttype/forms"/>
   </ds:schemaRefs>
 </ds:datastoreItem>
 </file>
@@ -6767,9 +6869,13 @@
 </file>
 
 <file path=customXml/itemProps3.xml><?xml version="1.0" encoding="utf-8"?>
-<ds:datastoreItem xmlns:ds="http://schemas.openxmlformats.org/officeDocument/2006/customXml" ds:itemID="{915C1F8C-D27A-4CE7-9DF4-4AFDB2880FA9}">
+<ds:datastoreItem xmlns:ds="http://schemas.openxmlformats.org/officeDocument/2006/customXml" ds:itemID="{FDF283A3-AA81-4663-8764-64F64C723FD1}">
   <ds:schemaRefs>
-    <ds:schemaRef ds:uri="http://schemas.microsoft.com/sharepoint/v3/contenttype/forms"/>
+    <ds:schemaRef ds:uri="http://schemas.microsoft.com/office/2006/metadata/properties"/>
+    <ds:schemaRef ds:uri="http://schemas.microsoft.com/office/infopath/2007/PartnerControls"/>
+    <ds:schemaRef ds:uri="71af3243-3dd4-4a8d-8c0d-dd76da1f02a5"/>
+    <ds:schemaRef ds:uri="http://schemas.microsoft.com/sharepoint/v3"/>
+    <ds:schemaRef ds:uri="230e9df3-be65-4c73-a93b-d1236ebd677e"/>
   </ds:schemaRefs>
 </ds:datastoreItem>
 </file>

</xml_diff>